<commit_message>
atualizando receptor e emissor
</commit_message>
<xml_diff>
--- a/circuito.pptx
+++ b/circuito.pptx
@@ -106,6 +106,11 @@
       </a:defRPr>
     </a:lvl9pPr>
   </p:defaultTextStyle>
+  <p:extLst>
+    <p:ext uri="{EFAFB233-063F-42B5-8137-9DF3F51BA10A}">
+      <p15:sldGuideLst xmlns:p15="http://schemas.microsoft.com/office/powerpoint/2012/main"/>
+    </p:ext>
+  </p:extLst>
 </p:presentation>
 </file>
 
@@ -256,7 +261,7 @@
           <a:p>
             <a:fld id="{0F16F349-DCF6-47D3-8093-93A1CE7DFFB5}" type="datetimeFigureOut">
               <a:rPr lang="pt-BR" smtClean="0"/>
-              <a:t>08/04/2024</a:t>
+              <a:t>23/04/2024</a:t>
             </a:fld>
             <a:endParaRPr lang="pt-BR"/>
           </a:p>
@@ -454,7 +459,7 @@
           <a:p>
             <a:fld id="{0F16F349-DCF6-47D3-8093-93A1CE7DFFB5}" type="datetimeFigureOut">
               <a:rPr lang="pt-BR" smtClean="0"/>
-              <a:t>08/04/2024</a:t>
+              <a:t>23/04/2024</a:t>
             </a:fld>
             <a:endParaRPr lang="pt-BR"/>
           </a:p>
@@ -662,7 +667,7 @@
           <a:p>
             <a:fld id="{0F16F349-DCF6-47D3-8093-93A1CE7DFFB5}" type="datetimeFigureOut">
               <a:rPr lang="pt-BR" smtClean="0"/>
-              <a:t>08/04/2024</a:t>
+              <a:t>23/04/2024</a:t>
             </a:fld>
             <a:endParaRPr lang="pt-BR"/>
           </a:p>
@@ -860,7 +865,7 @@
           <a:p>
             <a:fld id="{0F16F349-DCF6-47D3-8093-93A1CE7DFFB5}" type="datetimeFigureOut">
               <a:rPr lang="pt-BR" smtClean="0"/>
-              <a:t>08/04/2024</a:t>
+              <a:t>23/04/2024</a:t>
             </a:fld>
             <a:endParaRPr lang="pt-BR"/>
           </a:p>
@@ -1135,7 +1140,7 @@
           <a:p>
             <a:fld id="{0F16F349-DCF6-47D3-8093-93A1CE7DFFB5}" type="datetimeFigureOut">
               <a:rPr lang="pt-BR" smtClean="0"/>
-              <a:t>08/04/2024</a:t>
+              <a:t>23/04/2024</a:t>
             </a:fld>
             <a:endParaRPr lang="pt-BR"/>
           </a:p>
@@ -1400,7 +1405,7 @@
           <a:p>
             <a:fld id="{0F16F349-DCF6-47D3-8093-93A1CE7DFFB5}" type="datetimeFigureOut">
               <a:rPr lang="pt-BR" smtClean="0"/>
-              <a:t>08/04/2024</a:t>
+              <a:t>23/04/2024</a:t>
             </a:fld>
             <a:endParaRPr lang="pt-BR"/>
           </a:p>
@@ -1812,7 +1817,7 @@
           <a:p>
             <a:fld id="{0F16F349-DCF6-47D3-8093-93A1CE7DFFB5}" type="datetimeFigureOut">
               <a:rPr lang="pt-BR" smtClean="0"/>
-              <a:t>08/04/2024</a:t>
+              <a:t>23/04/2024</a:t>
             </a:fld>
             <a:endParaRPr lang="pt-BR"/>
           </a:p>
@@ -1953,7 +1958,7 @@
           <a:p>
             <a:fld id="{0F16F349-DCF6-47D3-8093-93A1CE7DFFB5}" type="datetimeFigureOut">
               <a:rPr lang="pt-BR" smtClean="0"/>
-              <a:t>08/04/2024</a:t>
+              <a:t>23/04/2024</a:t>
             </a:fld>
             <a:endParaRPr lang="pt-BR"/>
           </a:p>
@@ -2066,7 +2071,7 @@
           <a:p>
             <a:fld id="{0F16F349-DCF6-47D3-8093-93A1CE7DFFB5}" type="datetimeFigureOut">
               <a:rPr lang="pt-BR" smtClean="0"/>
-              <a:t>08/04/2024</a:t>
+              <a:t>23/04/2024</a:t>
             </a:fld>
             <a:endParaRPr lang="pt-BR"/>
           </a:p>
@@ -2377,7 +2382,7 @@
           <a:p>
             <a:fld id="{0F16F349-DCF6-47D3-8093-93A1CE7DFFB5}" type="datetimeFigureOut">
               <a:rPr lang="pt-BR" smtClean="0"/>
-              <a:t>08/04/2024</a:t>
+              <a:t>23/04/2024</a:t>
             </a:fld>
             <a:endParaRPr lang="pt-BR"/>
           </a:p>
@@ -2665,7 +2670,7 @@
           <a:p>
             <a:fld id="{0F16F349-DCF6-47D3-8093-93A1CE7DFFB5}" type="datetimeFigureOut">
               <a:rPr lang="pt-BR" smtClean="0"/>
-              <a:t>08/04/2024</a:t>
+              <a:t>23/04/2024</a:t>
             </a:fld>
             <a:endParaRPr lang="pt-BR"/>
           </a:p>
@@ -2906,7 +2911,7 @@
           <a:p>
             <a:fld id="{0F16F349-DCF6-47D3-8093-93A1CE7DFFB5}" type="datetimeFigureOut">
               <a:rPr lang="pt-BR" smtClean="0"/>
-              <a:t>08/04/2024</a:t>
+              <a:t>23/04/2024</a:t>
             </a:fld>
             <a:endParaRPr lang="pt-BR"/>
           </a:p>
@@ -3702,6 +3707,36 @@
           <a:xfrm>
             <a:off x="3810000" y="1924050"/>
             <a:ext cx="4572000" cy="3009900"/>
+          </a:xfrm>
+          <a:prstGeom prst="rect">
+            <a:avLst/>
+          </a:prstGeom>
+        </p:spPr>
+      </p:pic>
+      <p:pic>
+        <p:nvPicPr>
+          <p:cNvPr id="4" name="Imagem 3">
+            <a:extLst>
+              <a:ext uri="{FF2B5EF4-FFF2-40B4-BE49-F238E27FC236}">
+                <a16:creationId xmlns:a16="http://schemas.microsoft.com/office/drawing/2014/main" id="{C54FB003-8FA6-9C5A-502D-930BED2A3C79}"/>
+              </a:ext>
+            </a:extLst>
+          </p:cNvPr>
+          <p:cNvPicPr>
+            <a:picLocks noChangeAspect="1"/>
+          </p:cNvPicPr>
+          <p:nvPr/>
+        </p:nvPicPr>
+        <p:blipFill>
+          <a:blip r:embed="rId3"/>
+          <a:stretch>
+            <a:fillRect/>
+          </a:stretch>
+        </p:blipFill>
+        <p:spPr>
+          <a:xfrm>
+            <a:off x="1088412" y="2605015"/>
+            <a:ext cx="1505160" cy="1038370"/>
           </a:xfrm>
           <a:prstGeom prst="rect">
             <a:avLst/>

</xml_diff>